<commit_message>
ugfun.adoc - services and mixins
</commit_message>
<xml_diff>
--- a/adocs/documentation/src/main/asciidoc/guides/ugfun/images/core-concepts/philosophy/hexagonal-architecture.pptx
+++ b/adocs/documentation/src/main/asciidoc/guides/ugfun/images/core-concepts/philosophy/hexagonal-architecture.pptx
@@ -167,7 +167,7 @@
           <a:p>
             <a:fld id="{1428B44B-2FF9-4D06-B62B-7968FF54AAF1}" type="datetimeFigureOut">
               <a:rPr lang="en-GB" smtClean="0"/>
-              <a:t>02/05/2015</a:t>
+              <a:t>15/04/2017</a:t>
             </a:fld>
             <a:endParaRPr lang="en-GB"/>
           </a:p>
@@ -483,7 +483,7 @@
           <a:p>
             <a:fld id="{1428B44B-2FF9-4D06-B62B-7968FF54AAF1}" type="datetimeFigureOut">
               <a:rPr lang="en-GB" smtClean="0"/>
-              <a:t>02/05/2015</a:t>
+              <a:t>15/04/2017</a:t>
             </a:fld>
             <a:endParaRPr lang="en-GB"/>
           </a:p>
@@ -658,7 +658,7 @@
           <a:p>
             <a:fld id="{1428B44B-2FF9-4D06-B62B-7968FF54AAF1}" type="datetimeFigureOut">
               <a:rPr lang="en-GB" smtClean="0"/>
-              <a:t>02/05/2015</a:t>
+              <a:t>15/04/2017</a:t>
             </a:fld>
             <a:endParaRPr lang="en-GB"/>
           </a:p>
@@ -776,7 +776,7 @@
           <a:p>
             <a:fld id="{1428B44B-2FF9-4D06-B62B-7968FF54AAF1}" type="datetimeFigureOut">
               <a:rPr lang="en-GB" smtClean="0"/>
-              <a:t>02/05/2015</a:t>
+              <a:t>15/04/2017</a:t>
             </a:fld>
             <a:endParaRPr lang="en-GB"/>
           </a:p>
@@ -1074,7 +1074,7 @@
           <a:p>
             <a:fld id="{1428B44B-2FF9-4D06-B62B-7968FF54AAF1}" type="datetimeFigureOut">
               <a:rPr lang="en-GB" smtClean="0"/>
-              <a:t>02/05/2015</a:t>
+              <a:t>15/04/2017</a:t>
             </a:fld>
             <a:endParaRPr lang="en-GB"/>
           </a:p>
@@ -1367,7 +1367,7 @@
           <a:p>
             <a:fld id="{1428B44B-2FF9-4D06-B62B-7968FF54AAF1}" type="datetimeFigureOut">
               <a:rPr lang="en-GB" smtClean="0"/>
-              <a:t>02/05/2015</a:t>
+              <a:t>15/04/2017</a:t>
             </a:fld>
             <a:endParaRPr lang="en-GB"/>
           </a:p>
@@ -1795,7 +1795,7 @@
           <a:p>
             <a:fld id="{1428B44B-2FF9-4D06-B62B-7968FF54AAF1}" type="datetimeFigureOut">
               <a:rPr lang="en-GB" smtClean="0"/>
-              <a:t>02/05/2015</a:t>
+              <a:t>15/04/2017</a:t>
             </a:fld>
             <a:endParaRPr lang="en-GB"/>
           </a:p>
@@ -1913,7 +1913,7 @@
           <a:p>
             <a:fld id="{1428B44B-2FF9-4D06-B62B-7968FF54AAF1}" type="datetimeFigureOut">
               <a:rPr lang="en-GB" smtClean="0"/>
-              <a:t>02/05/2015</a:t>
+              <a:t>15/04/2017</a:t>
             </a:fld>
             <a:endParaRPr lang="en-GB"/>
           </a:p>
@@ -2003,7 +2003,7 @@
           <a:p>
             <a:fld id="{1428B44B-2FF9-4D06-B62B-7968FF54AAF1}" type="datetimeFigureOut">
               <a:rPr lang="en-GB" smtClean="0"/>
-              <a:t>02/05/2015</a:t>
+              <a:t>15/04/2017</a:t>
             </a:fld>
             <a:endParaRPr lang="en-GB"/>
           </a:p>
@@ -2253,7 +2253,7 @@
           <a:p>
             <a:fld id="{1428B44B-2FF9-4D06-B62B-7968FF54AAF1}" type="datetimeFigureOut">
               <a:rPr lang="en-GB" smtClean="0"/>
-              <a:t>02/05/2015</a:t>
+              <a:t>15/04/2017</a:t>
             </a:fld>
             <a:endParaRPr lang="en-GB"/>
           </a:p>
@@ -2769,7 +2769,7 @@
           <a:p>
             <a:fld id="{1428B44B-2FF9-4D06-B62B-7968FF54AAF1}" type="datetimeFigureOut">
               <a:rPr lang="en-GB" smtClean="0"/>
-              <a:t>02/05/2015</a:t>
+              <a:t>15/04/2017</a:t>
             </a:fld>
             <a:endParaRPr lang="en-GB"/>
           </a:p>
@@ -2999,7 +2999,7 @@
           <a:p>
             <a:fld id="{1428B44B-2FF9-4D06-B62B-7968FF54AAF1}" type="datetimeFigureOut">
               <a:rPr lang="en-GB" smtClean="0"/>
-              <a:t>02/05/2015</a:t>
+              <a:t>15/04/2017</a:t>
             </a:fld>
             <a:endParaRPr lang="en-GB"/>
           </a:p>
@@ -4281,559 +4281,6 @@
           </a:p>
         </p:txBody>
       </p:sp>
-      <p:grpSp>
-        <p:nvGrpSpPr>
-          <p:cNvPr id="94" name="Group 93"/>
-          <p:cNvGrpSpPr/>
-          <p:nvPr/>
-        </p:nvGrpSpPr>
-        <p:grpSpPr>
-          <a:xfrm>
-            <a:off x="5776436" y="2844738"/>
-            <a:ext cx="3188052" cy="803136"/>
-            <a:chOff x="5776436" y="2811986"/>
-            <a:chExt cx="3188052" cy="803136"/>
-          </a:xfrm>
-        </p:grpSpPr>
-        <p:cxnSp>
-          <p:nvCxnSpPr>
-            <p:cNvPr id="41" name="Curved Connector 40"/>
-            <p:cNvCxnSpPr>
-              <a:stCxn id="29" idx="3"/>
-              <a:endCxn id="14" idx="1"/>
-            </p:cNvCxnSpPr>
-            <p:nvPr/>
-          </p:nvCxnSpPr>
-          <p:spPr>
-            <a:xfrm>
-              <a:off x="5776436" y="3193580"/>
-              <a:ext cx="523756" cy="9577"/>
-            </a:xfrm>
-            <a:prstGeom prst="curvedConnector3">
-              <a:avLst>
-                <a:gd name="adj1" fmla="val 50000"/>
-              </a:avLst>
-            </a:prstGeom>
-            <a:ln w="19050">
-              <a:headEnd type="none"/>
-              <a:tailEnd type="arrow"/>
-            </a:ln>
-          </p:spPr>
-          <p:style>
-            <a:lnRef idx="2">
-              <a:schemeClr val="accent5"/>
-            </a:lnRef>
-            <a:fillRef idx="0">
-              <a:schemeClr val="accent5"/>
-            </a:fillRef>
-            <a:effectRef idx="1">
-              <a:schemeClr val="accent5"/>
-            </a:effectRef>
-            <a:fontRef idx="minor">
-              <a:schemeClr val="tx1"/>
-            </a:fontRef>
-          </p:style>
-        </p:cxnSp>
-        <p:sp>
-          <p:nvSpPr>
-            <p:cNvPr id="14" name="Rectangle 13"/>
-            <p:cNvSpPr/>
-            <p:nvPr/>
-          </p:nvSpPr>
-          <p:spPr>
-            <a:xfrm>
-              <a:off x="6300192" y="2863200"/>
-              <a:ext cx="1311974" cy="679913"/>
-            </a:xfrm>
-            <a:prstGeom prst="rect">
-              <a:avLst/>
-            </a:prstGeom>
-          </p:spPr>
-          <p:style>
-            <a:lnRef idx="1">
-              <a:schemeClr val="accent5"/>
-            </a:lnRef>
-            <a:fillRef idx="2">
-              <a:schemeClr val="accent5"/>
-            </a:fillRef>
-            <a:effectRef idx="1">
-              <a:schemeClr val="accent5"/>
-            </a:effectRef>
-            <a:fontRef idx="minor">
-              <a:schemeClr val="dk1"/>
-            </a:fontRef>
-          </p:style>
-          <p:txBody>
-            <a:bodyPr rtlCol="0" anchor="ctr"/>
-            <a:lstStyle/>
-            <a:p>
-              <a:pPr algn="ctr"/>
-              <a:r>
-                <a:rPr lang="en-GB" dirty="0" err="1" smtClean="0"/>
-                <a:t>DataNucleus</a:t>
-              </a:r>
-              <a:r>
-                <a:rPr lang="en-GB" dirty="0" smtClean="0"/>
-                <a:t>/</a:t>
-              </a:r>
-              <a:br>
-                <a:rPr lang="en-GB" dirty="0" smtClean="0"/>
-              </a:br>
-              <a:r>
-                <a:rPr lang="en-GB" dirty="0" smtClean="0"/>
-                <a:t>RDBMS</a:t>
-              </a:r>
-              <a:endParaRPr lang="en-GB" dirty="0"/>
-            </a:p>
-          </p:txBody>
-        </p:sp>
-        <p:sp>
-          <p:nvSpPr>
-            <p:cNvPr id="16" name="Flowchart: Magnetic Disk 15"/>
-            <p:cNvSpPr/>
-            <p:nvPr/>
-          </p:nvSpPr>
-          <p:spPr>
-            <a:xfrm>
-              <a:off x="8028384" y="2811986"/>
-              <a:ext cx="936104" cy="803136"/>
-            </a:xfrm>
-            <a:prstGeom prst="flowChartMagneticDisk">
-              <a:avLst/>
-            </a:prstGeom>
-          </p:spPr>
-          <p:style>
-            <a:lnRef idx="1">
-              <a:schemeClr val="accent5"/>
-            </a:lnRef>
-            <a:fillRef idx="2">
-              <a:schemeClr val="accent5"/>
-            </a:fillRef>
-            <a:effectRef idx="1">
-              <a:schemeClr val="accent5"/>
-            </a:effectRef>
-            <a:fontRef idx="minor">
-              <a:schemeClr val="dk1"/>
-            </a:fontRef>
-          </p:style>
-          <p:txBody>
-            <a:bodyPr rtlCol="0" anchor="ctr"/>
-            <a:lstStyle/>
-            <a:p>
-              <a:pPr algn="ctr"/>
-              <a:r>
-                <a:rPr lang="en-GB" dirty="0" smtClean="0"/>
-                <a:t>RDBMS</a:t>
-              </a:r>
-              <a:endParaRPr lang="en-GB" dirty="0"/>
-            </a:p>
-          </p:txBody>
-        </p:sp>
-        <p:cxnSp>
-          <p:nvCxnSpPr>
-            <p:cNvPr id="88" name="Curved Connector 87"/>
-            <p:cNvCxnSpPr>
-              <a:stCxn id="14" idx="3"/>
-              <a:endCxn id="16" idx="2"/>
-            </p:cNvCxnSpPr>
-            <p:nvPr/>
-          </p:nvCxnSpPr>
-          <p:spPr>
-            <a:xfrm>
-              <a:off x="7612166" y="3203157"/>
-              <a:ext cx="416218" cy="10397"/>
-            </a:xfrm>
-            <a:prstGeom prst="curvedConnector3">
-              <a:avLst>
-                <a:gd name="adj1" fmla="val 50000"/>
-              </a:avLst>
-            </a:prstGeom>
-            <a:ln w="19050">
-              <a:headEnd type="none"/>
-              <a:tailEnd type="arrow"/>
-            </a:ln>
-          </p:spPr>
-          <p:style>
-            <a:lnRef idx="2">
-              <a:schemeClr val="accent5"/>
-            </a:lnRef>
-            <a:fillRef idx="0">
-              <a:schemeClr val="accent5"/>
-            </a:fillRef>
-            <a:effectRef idx="1">
-              <a:schemeClr val="accent5"/>
-            </a:effectRef>
-            <a:fontRef idx="minor">
-              <a:schemeClr val="tx1"/>
-            </a:fontRef>
-          </p:style>
-        </p:cxnSp>
-      </p:grpSp>
-      <p:grpSp>
-        <p:nvGrpSpPr>
-          <p:cNvPr id="95" name="Group 94"/>
-          <p:cNvGrpSpPr/>
-          <p:nvPr/>
-        </p:nvGrpSpPr>
-        <p:grpSpPr>
-          <a:xfrm>
-            <a:off x="5776436" y="3226332"/>
-            <a:ext cx="3188052" cy="1376500"/>
-            <a:chOff x="5776436" y="3132620"/>
-            <a:chExt cx="3188052" cy="1376500"/>
-          </a:xfrm>
-        </p:grpSpPr>
-        <p:cxnSp>
-          <p:nvCxnSpPr>
-            <p:cNvPr id="38" name="Curved Connector 37"/>
-            <p:cNvCxnSpPr>
-              <a:stCxn id="29" idx="3"/>
-              <a:endCxn id="17" idx="1"/>
-            </p:cNvCxnSpPr>
-            <p:nvPr/>
-          </p:nvCxnSpPr>
-          <p:spPr>
-            <a:xfrm>
-              <a:off x="5776436" y="3132620"/>
-              <a:ext cx="523756" cy="963159"/>
-            </a:xfrm>
-            <a:prstGeom prst="curvedConnector3">
-              <a:avLst>
-                <a:gd name="adj1" fmla="val 50000"/>
-              </a:avLst>
-            </a:prstGeom>
-            <a:ln w="19050">
-              <a:headEnd type="none"/>
-              <a:tailEnd type="arrow"/>
-            </a:ln>
-          </p:spPr>
-          <p:style>
-            <a:lnRef idx="2">
-              <a:schemeClr val="accent5"/>
-            </a:lnRef>
-            <a:fillRef idx="0">
-              <a:schemeClr val="accent5"/>
-            </a:fillRef>
-            <a:effectRef idx="1">
-              <a:schemeClr val="accent5"/>
-            </a:effectRef>
-            <a:fontRef idx="minor">
-              <a:schemeClr val="tx1"/>
-            </a:fontRef>
-          </p:style>
-        </p:cxnSp>
-        <p:sp>
-          <p:nvSpPr>
-            <p:cNvPr id="17" name="Rectangle 16"/>
-            <p:cNvSpPr/>
-            <p:nvPr/>
-          </p:nvSpPr>
-          <p:spPr>
-            <a:xfrm>
-              <a:off x="6300192" y="3754446"/>
-              <a:ext cx="1311974" cy="682666"/>
-            </a:xfrm>
-            <a:prstGeom prst="rect">
-              <a:avLst/>
-            </a:prstGeom>
-          </p:spPr>
-          <p:style>
-            <a:lnRef idx="1">
-              <a:schemeClr val="accent5"/>
-            </a:lnRef>
-            <a:fillRef idx="2">
-              <a:schemeClr val="accent5"/>
-            </a:fillRef>
-            <a:effectRef idx="1">
-              <a:schemeClr val="accent5"/>
-            </a:effectRef>
-            <a:fontRef idx="minor">
-              <a:schemeClr val="dk1"/>
-            </a:fontRef>
-          </p:style>
-          <p:txBody>
-            <a:bodyPr rtlCol="0" anchor="ctr"/>
-            <a:lstStyle/>
-            <a:p>
-              <a:pPr algn="ctr"/>
-              <a:r>
-                <a:rPr lang="en-GB" dirty="0" smtClean="0"/>
-                <a:t>JDO/GAE</a:t>
-              </a:r>
-              <a:endParaRPr lang="en-GB" dirty="0"/>
-            </a:p>
-          </p:txBody>
-        </p:sp>
-        <p:sp>
-          <p:nvSpPr>
-            <p:cNvPr id="18" name="Flowchart: Magnetic Disk 17"/>
-            <p:cNvSpPr/>
-            <p:nvPr/>
-          </p:nvSpPr>
-          <p:spPr>
-            <a:xfrm>
-              <a:off x="8028384" y="3702732"/>
-              <a:ext cx="936104" cy="806388"/>
-            </a:xfrm>
-            <a:prstGeom prst="flowChartMagneticDisk">
-              <a:avLst/>
-            </a:prstGeom>
-          </p:spPr>
-          <p:style>
-            <a:lnRef idx="1">
-              <a:schemeClr val="accent5"/>
-            </a:lnRef>
-            <a:fillRef idx="2">
-              <a:schemeClr val="accent5"/>
-            </a:fillRef>
-            <a:effectRef idx="1">
-              <a:schemeClr val="accent5"/>
-            </a:effectRef>
-            <a:fontRef idx="minor">
-              <a:schemeClr val="dk1"/>
-            </a:fontRef>
-          </p:style>
-          <p:txBody>
-            <a:bodyPr rtlCol="0" anchor="ctr"/>
-            <a:lstStyle/>
-            <a:p>
-              <a:pPr algn="ctr"/>
-              <a:r>
-                <a:rPr lang="en-GB" dirty="0" smtClean="0"/>
-                <a:t>GAE</a:t>
-              </a:r>
-              <a:endParaRPr lang="en-GB" dirty="0"/>
-            </a:p>
-          </p:txBody>
-        </p:sp>
-        <p:cxnSp>
-          <p:nvCxnSpPr>
-            <p:cNvPr id="91" name="Curved Connector 90"/>
-            <p:cNvCxnSpPr>
-              <a:stCxn id="17" idx="3"/>
-              <a:endCxn id="18" idx="2"/>
-            </p:cNvCxnSpPr>
-            <p:nvPr/>
-          </p:nvCxnSpPr>
-          <p:spPr>
-            <a:xfrm>
-              <a:off x="7612166" y="4095779"/>
-              <a:ext cx="416218" cy="10147"/>
-            </a:xfrm>
-            <a:prstGeom prst="curvedConnector3">
-              <a:avLst>
-                <a:gd name="adj1" fmla="val 50000"/>
-              </a:avLst>
-            </a:prstGeom>
-            <a:ln w="19050">
-              <a:headEnd type="none"/>
-              <a:tailEnd type="arrow"/>
-            </a:ln>
-          </p:spPr>
-          <p:style>
-            <a:lnRef idx="2">
-              <a:schemeClr val="accent5"/>
-            </a:lnRef>
-            <a:fillRef idx="0">
-              <a:schemeClr val="accent5"/>
-            </a:fillRef>
-            <a:effectRef idx="1">
-              <a:schemeClr val="accent5"/>
-            </a:effectRef>
-            <a:fontRef idx="minor">
-              <a:schemeClr val="tx1"/>
-            </a:fontRef>
-          </p:style>
-        </p:cxnSp>
-      </p:grpSp>
-      <p:grpSp>
-        <p:nvGrpSpPr>
-          <p:cNvPr id="64" name="Group 63"/>
-          <p:cNvGrpSpPr/>
-          <p:nvPr/>
-        </p:nvGrpSpPr>
-        <p:grpSpPr>
-          <a:xfrm>
-            <a:off x="5776436" y="1850302"/>
-            <a:ext cx="3207752" cy="1376030"/>
-            <a:chOff x="5756736" y="3702732"/>
-            <a:chExt cx="3207752" cy="1376030"/>
-          </a:xfrm>
-        </p:grpSpPr>
-        <p:cxnSp>
-          <p:nvCxnSpPr>
-            <p:cNvPr id="65" name="Curved Connector 64"/>
-            <p:cNvCxnSpPr>
-              <a:stCxn id="29" idx="3"/>
-              <a:endCxn id="67" idx="1"/>
-            </p:cNvCxnSpPr>
-            <p:nvPr/>
-          </p:nvCxnSpPr>
-          <p:spPr>
-            <a:xfrm flipV="1">
-              <a:off x="5756736" y="4095779"/>
-              <a:ext cx="543456" cy="982983"/>
-            </a:xfrm>
-            <a:prstGeom prst="curvedConnector3">
-              <a:avLst>
-                <a:gd name="adj1" fmla="val 50000"/>
-              </a:avLst>
-            </a:prstGeom>
-            <a:ln w="19050">
-              <a:headEnd type="none"/>
-              <a:tailEnd type="arrow"/>
-            </a:ln>
-          </p:spPr>
-          <p:style>
-            <a:lnRef idx="2">
-              <a:schemeClr val="accent5"/>
-            </a:lnRef>
-            <a:fillRef idx="0">
-              <a:schemeClr val="accent5"/>
-            </a:fillRef>
-            <a:effectRef idx="1">
-              <a:schemeClr val="accent5"/>
-            </a:effectRef>
-            <a:fontRef idx="minor">
-              <a:schemeClr val="tx1"/>
-            </a:fontRef>
-          </p:style>
-        </p:cxnSp>
-        <p:sp>
-          <p:nvSpPr>
-            <p:cNvPr id="67" name="Rectangle 66"/>
-            <p:cNvSpPr/>
-            <p:nvPr/>
-          </p:nvSpPr>
-          <p:spPr>
-            <a:xfrm>
-              <a:off x="6300192" y="3754446"/>
-              <a:ext cx="1311974" cy="682666"/>
-            </a:xfrm>
-            <a:prstGeom prst="rect">
-              <a:avLst/>
-            </a:prstGeom>
-          </p:spPr>
-          <p:style>
-            <a:lnRef idx="1">
-              <a:schemeClr val="accent5"/>
-            </a:lnRef>
-            <a:fillRef idx="2">
-              <a:schemeClr val="accent5"/>
-            </a:fillRef>
-            <a:effectRef idx="1">
-              <a:schemeClr val="accent5"/>
-            </a:effectRef>
-            <a:fontRef idx="minor">
-              <a:schemeClr val="dk1"/>
-            </a:fontRef>
-          </p:style>
-          <p:txBody>
-            <a:bodyPr rtlCol="0" anchor="ctr"/>
-            <a:lstStyle/>
-            <a:p>
-              <a:pPr algn="ctr"/>
-              <a:r>
-                <a:rPr lang="en-GB" dirty="0" err="1" smtClean="0"/>
-                <a:t>DataNucleus</a:t>
-              </a:r>
-              <a:r>
-                <a:rPr lang="en-GB" dirty="0" smtClean="0"/>
-                <a:t>/</a:t>
-              </a:r>
-              <a:br>
-                <a:rPr lang="en-GB" dirty="0" smtClean="0"/>
-              </a:br>
-              <a:r>
-                <a:rPr lang="en-GB" dirty="0" smtClean="0"/>
-                <a:t>Neo4J</a:t>
-              </a:r>
-              <a:endParaRPr lang="en-GB" dirty="0"/>
-            </a:p>
-          </p:txBody>
-        </p:sp>
-        <p:sp>
-          <p:nvSpPr>
-            <p:cNvPr id="69" name="Flowchart: Magnetic Disk 68"/>
-            <p:cNvSpPr/>
-            <p:nvPr/>
-          </p:nvSpPr>
-          <p:spPr>
-            <a:xfrm>
-              <a:off x="8028384" y="3702732"/>
-              <a:ext cx="936104" cy="806388"/>
-            </a:xfrm>
-            <a:prstGeom prst="flowChartMagneticDisk">
-              <a:avLst/>
-            </a:prstGeom>
-          </p:spPr>
-          <p:style>
-            <a:lnRef idx="1">
-              <a:schemeClr val="accent5"/>
-            </a:lnRef>
-            <a:fillRef idx="2">
-              <a:schemeClr val="accent5"/>
-            </a:fillRef>
-            <a:effectRef idx="1">
-              <a:schemeClr val="accent5"/>
-            </a:effectRef>
-            <a:fontRef idx="minor">
-              <a:schemeClr val="dk1"/>
-            </a:fontRef>
-          </p:style>
-          <p:txBody>
-            <a:bodyPr rtlCol="0" anchor="ctr"/>
-            <a:lstStyle/>
-            <a:p>
-              <a:pPr algn="ctr"/>
-              <a:r>
-                <a:rPr lang="en-GB" dirty="0" smtClean="0"/>
-                <a:t>Neo4J</a:t>
-              </a:r>
-              <a:endParaRPr lang="en-GB" dirty="0"/>
-            </a:p>
-          </p:txBody>
-        </p:sp>
-        <p:cxnSp>
-          <p:nvCxnSpPr>
-            <p:cNvPr id="70" name="Curved Connector 69"/>
-            <p:cNvCxnSpPr>
-              <a:stCxn id="67" idx="3"/>
-              <a:endCxn id="69" idx="2"/>
-            </p:cNvCxnSpPr>
-            <p:nvPr/>
-          </p:nvCxnSpPr>
-          <p:spPr>
-            <a:xfrm>
-              <a:off x="7612166" y="4095779"/>
-              <a:ext cx="416218" cy="10147"/>
-            </a:xfrm>
-            <a:prstGeom prst="curvedConnector3">
-              <a:avLst>
-                <a:gd name="adj1" fmla="val 50000"/>
-              </a:avLst>
-            </a:prstGeom>
-            <a:ln w="19050">
-              <a:headEnd type="none"/>
-              <a:tailEnd type="arrow"/>
-            </a:ln>
-          </p:spPr>
-          <p:style>
-            <a:lnRef idx="2">
-              <a:schemeClr val="accent5"/>
-            </a:lnRef>
-            <a:fillRef idx="0">
-              <a:schemeClr val="accent5"/>
-            </a:fillRef>
-            <a:effectRef idx="1">
-              <a:schemeClr val="accent5"/>
-            </a:effectRef>
-            <a:fontRef idx="minor">
-              <a:schemeClr val="tx1"/>
-            </a:fontRef>
-          </p:style>
-        </p:cxnSp>
-      </p:grpSp>
       <p:sp>
         <p:nvSpPr>
           <p:cNvPr id="114" name="Oval 113"/>
@@ -4874,6 +4321,350 @@
           </a:p>
         </p:txBody>
       </p:sp>
+      <p:cxnSp>
+        <p:nvCxnSpPr>
+          <p:cNvPr id="43" name="Curved Connector 42"/>
+          <p:cNvCxnSpPr>
+            <a:endCxn id="44" idx="1"/>
+          </p:cNvCxnSpPr>
+          <p:nvPr/>
+        </p:nvCxnSpPr>
+        <p:spPr>
+          <a:xfrm>
+            <a:off x="5776436" y="3226332"/>
+            <a:ext cx="523756" cy="667723"/>
+          </a:xfrm>
+          <a:prstGeom prst="curvedConnector3">
+            <a:avLst>
+              <a:gd name="adj1" fmla="val 50000"/>
+            </a:avLst>
+          </a:prstGeom>
+          <a:ln w="19050">
+            <a:headEnd type="none"/>
+            <a:tailEnd type="arrow"/>
+          </a:ln>
+        </p:spPr>
+        <p:style>
+          <a:lnRef idx="2">
+            <a:schemeClr val="accent5"/>
+          </a:lnRef>
+          <a:fillRef idx="0">
+            <a:schemeClr val="accent5"/>
+          </a:fillRef>
+          <a:effectRef idx="1">
+            <a:schemeClr val="accent5"/>
+          </a:effectRef>
+          <a:fontRef idx="minor">
+            <a:schemeClr val="tx1"/>
+          </a:fontRef>
+        </p:style>
+      </p:cxnSp>
+      <p:sp>
+        <p:nvSpPr>
+          <p:cNvPr id="44" name="Rectangle 43"/>
+          <p:cNvSpPr/>
+          <p:nvPr/>
+        </p:nvSpPr>
+        <p:spPr>
+          <a:xfrm>
+            <a:off x="6300192" y="3552722"/>
+            <a:ext cx="1311974" cy="682666"/>
+          </a:xfrm>
+          <a:prstGeom prst="rect">
+            <a:avLst/>
+          </a:prstGeom>
+        </p:spPr>
+        <p:style>
+          <a:lnRef idx="1">
+            <a:schemeClr val="accent5"/>
+          </a:lnRef>
+          <a:fillRef idx="2">
+            <a:schemeClr val="accent5"/>
+          </a:fillRef>
+          <a:effectRef idx="1">
+            <a:schemeClr val="accent5"/>
+          </a:effectRef>
+          <a:fontRef idx="minor">
+            <a:schemeClr val="dk1"/>
+          </a:fontRef>
+        </p:style>
+        <p:txBody>
+          <a:bodyPr rtlCol="0" anchor="ctr"/>
+          <a:lstStyle/>
+          <a:p>
+            <a:pPr algn="ctr"/>
+            <a:r>
+              <a:rPr lang="en-GB" dirty="0" err="1"/>
+              <a:t>DataNucleus</a:t>
+            </a:r>
+            <a:r>
+              <a:rPr lang="en-GB" dirty="0"/>
+              <a:t>/</a:t>
+            </a:r>
+            <a:br>
+              <a:rPr lang="en-GB" dirty="0"/>
+            </a:br>
+            <a:r>
+              <a:rPr lang="en-GB" dirty="0"/>
+              <a:t>RDBMS</a:t>
+            </a:r>
+            <a:endParaRPr lang="en-GB" dirty="0"/>
+          </a:p>
+        </p:txBody>
+      </p:sp>
+      <p:sp>
+        <p:nvSpPr>
+          <p:cNvPr id="45" name="Flowchart: Magnetic Disk 44"/>
+          <p:cNvSpPr/>
+          <p:nvPr/>
+        </p:nvSpPr>
+        <p:spPr>
+          <a:xfrm>
+            <a:off x="8028384" y="3501008"/>
+            <a:ext cx="936104" cy="806388"/>
+          </a:xfrm>
+          <a:prstGeom prst="flowChartMagneticDisk">
+            <a:avLst/>
+          </a:prstGeom>
+        </p:spPr>
+        <p:style>
+          <a:lnRef idx="1">
+            <a:schemeClr val="accent5"/>
+          </a:lnRef>
+          <a:fillRef idx="2">
+            <a:schemeClr val="accent5"/>
+          </a:fillRef>
+          <a:effectRef idx="1">
+            <a:schemeClr val="accent5"/>
+          </a:effectRef>
+          <a:fontRef idx="minor">
+            <a:schemeClr val="dk1"/>
+          </a:fontRef>
+        </p:style>
+        <p:txBody>
+          <a:bodyPr rtlCol="0" anchor="ctr"/>
+          <a:lstStyle/>
+          <a:p>
+            <a:pPr algn="ctr"/>
+            <a:r>
+              <a:rPr lang="en-GB" dirty="0" smtClean="0"/>
+              <a:t>RDBMS</a:t>
+            </a:r>
+            <a:endParaRPr lang="en-GB" dirty="0"/>
+          </a:p>
+        </p:txBody>
+      </p:sp>
+      <p:cxnSp>
+        <p:nvCxnSpPr>
+          <p:cNvPr id="46" name="Curved Connector 45"/>
+          <p:cNvCxnSpPr>
+            <a:stCxn id="44" idx="3"/>
+            <a:endCxn id="45" idx="2"/>
+          </p:cNvCxnSpPr>
+          <p:nvPr/>
+        </p:nvCxnSpPr>
+        <p:spPr>
+          <a:xfrm>
+            <a:off x="7612166" y="3894055"/>
+            <a:ext cx="416218" cy="10147"/>
+          </a:xfrm>
+          <a:prstGeom prst="curvedConnector3">
+            <a:avLst>
+              <a:gd name="adj1" fmla="val 50000"/>
+            </a:avLst>
+          </a:prstGeom>
+          <a:ln w="19050">
+            <a:headEnd type="none"/>
+            <a:tailEnd type="arrow"/>
+          </a:ln>
+        </p:spPr>
+        <p:style>
+          <a:lnRef idx="2">
+            <a:schemeClr val="accent5"/>
+          </a:lnRef>
+          <a:fillRef idx="0">
+            <a:schemeClr val="accent5"/>
+          </a:fillRef>
+          <a:effectRef idx="1">
+            <a:schemeClr val="accent5"/>
+          </a:effectRef>
+          <a:fontRef idx="minor">
+            <a:schemeClr val="tx1"/>
+          </a:fontRef>
+        </p:style>
+      </p:cxnSp>
+      <p:cxnSp>
+        <p:nvCxnSpPr>
+          <p:cNvPr id="47" name="Curved Connector 46"/>
+          <p:cNvCxnSpPr>
+            <a:endCxn id="48" idx="1"/>
+          </p:cNvCxnSpPr>
+          <p:nvPr/>
+        </p:nvCxnSpPr>
+        <p:spPr>
+          <a:xfrm flipV="1">
+            <a:off x="5776436" y="2511603"/>
+            <a:ext cx="543456" cy="714729"/>
+          </a:xfrm>
+          <a:prstGeom prst="curvedConnector3">
+            <a:avLst>
+              <a:gd name="adj1" fmla="val 50000"/>
+            </a:avLst>
+          </a:prstGeom>
+          <a:ln w="19050">
+            <a:headEnd type="none"/>
+            <a:tailEnd type="arrow"/>
+          </a:ln>
+        </p:spPr>
+        <p:style>
+          <a:lnRef idx="2">
+            <a:schemeClr val="accent5"/>
+          </a:lnRef>
+          <a:fillRef idx="0">
+            <a:schemeClr val="accent5"/>
+          </a:fillRef>
+          <a:effectRef idx="1">
+            <a:schemeClr val="accent5"/>
+          </a:effectRef>
+          <a:fontRef idx="minor">
+            <a:schemeClr val="tx1"/>
+          </a:fontRef>
+        </p:style>
+      </p:cxnSp>
+      <p:sp>
+        <p:nvSpPr>
+          <p:cNvPr id="48" name="Rectangle 47"/>
+          <p:cNvSpPr/>
+          <p:nvPr/>
+        </p:nvSpPr>
+        <p:spPr>
+          <a:xfrm>
+            <a:off x="6319892" y="2170270"/>
+            <a:ext cx="1311974" cy="682666"/>
+          </a:xfrm>
+          <a:prstGeom prst="rect">
+            <a:avLst/>
+          </a:prstGeom>
+        </p:spPr>
+        <p:style>
+          <a:lnRef idx="1">
+            <a:schemeClr val="accent5"/>
+          </a:lnRef>
+          <a:fillRef idx="2">
+            <a:schemeClr val="accent5"/>
+          </a:fillRef>
+          <a:effectRef idx="1">
+            <a:schemeClr val="accent5"/>
+          </a:effectRef>
+          <a:fontRef idx="minor">
+            <a:schemeClr val="dk1"/>
+          </a:fontRef>
+        </p:style>
+        <p:txBody>
+          <a:bodyPr rtlCol="0" anchor="ctr"/>
+          <a:lstStyle/>
+          <a:p>
+            <a:pPr algn="ctr"/>
+            <a:r>
+              <a:rPr lang="en-GB" dirty="0" err="1" smtClean="0"/>
+              <a:t>DataNucleus</a:t>
+            </a:r>
+            <a:r>
+              <a:rPr lang="en-GB" dirty="0" smtClean="0"/>
+              <a:t>/</a:t>
+            </a:r>
+            <a:br>
+              <a:rPr lang="en-GB" dirty="0" smtClean="0"/>
+            </a:br>
+            <a:r>
+              <a:rPr lang="en-GB" dirty="0" smtClean="0"/>
+              <a:t>Neo4J</a:t>
+            </a:r>
+            <a:endParaRPr lang="en-GB" dirty="0"/>
+          </a:p>
+        </p:txBody>
+      </p:sp>
+      <p:sp>
+        <p:nvSpPr>
+          <p:cNvPr id="49" name="Flowchart: Magnetic Disk 48"/>
+          <p:cNvSpPr/>
+          <p:nvPr/>
+        </p:nvSpPr>
+        <p:spPr>
+          <a:xfrm>
+            <a:off x="8048084" y="2118556"/>
+            <a:ext cx="936104" cy="806388"/>
+          </a:xfrm>
+          <a:prstGeom prst="flowChartMagneticDisk">
+            <a:avLst/>
+          </a:prstGeom>
+        </p:spPr>
+        <p:style>
+          <a:lnRef idx="1">
+            <a:schemeClr val="accent5"/>
+          </a:lnRef>
+          <a:fillRef idx="2">
+            <a:schemeClr val="accent5"/>
+          </a:fillRef>
+          <a:effectRef idx="1">
+            <a:schemeClr val="accent5"/>
+          </a:effectRef>
+          <a:fontRef idx="minor">
+            <a:schemeClr val="dk1"/>
+          </a:fontRef>
+        </p:style>
+        <p:txBody>
+          <a:bodyPr rtlCol="0" anchor="ctr"/>
+          <a:lstStyle/>
+          <a:p>
+            <a:pPr algn="ctr"/>
+            <a:r>
+              <a:rPr lang="en-GB" dirty="0" smtClean="0"/>
+              <a:t>Neo4J</a:t>
+            </a:r>
+            <a:endParaRPr lang="en-GB" dirty="0"/>
+          </a:p>
+        </p:txBody>
+      </p:sp>
+      <p:cxnSp>
+        <p:nvCxnSpPr>
+          <p:cNvPr id="50" name="Curved Connector 49"/>
+          <p:cNvCxnSpPr>
+            <a:stCxn id="48" idx="3"/>
+            <a:endCxn id="49" idx="2"/>
+          </p:cNvCxnSpPr>
+          <p:nvPr/>
+        </p:nvCxnSpPr>
+        <p:spPr>
+          <a:xfrm>
+            <a:off x="7631866" y="2511603"/>
+            <a:ext cx="416218" cy="10147"/>
+          </a:xfrm>
+          <a:prstGeom prst="curvedConnector3">
+            <a:avLst>
+              <a:gd name="adj1" fmla="val 50000"/>
+            </a:avLst>
+          </a:prstGeom>
+          <a:ln w="19050">
+            <a:headEnd type="none"/>
+            <a:tailEnd type="arrow"/>
+          </a:ln>
+        </p:spPr>
+        <p:style>
+          <a:lnRef idx="2">
+            <a:schemeClr val="accent5"/>
+          </a:lnRef>
+          <a:fillRef idx="0">
+            <a:schemeClr val="accent5"/>
+          </a:fillRef>
+          <a:effectRef idx="1">
+            <a:schemeClr val="accent5"/>
+          </a:effectRef>
+          <a:fontRef idx="minor">
+            <a:schemeClr val="tx1"/>
+          </a:fontRef>
+        </p:style>
+      </p:cxnSp>
     </p:spTree>
     <p:extLst>
       <p:ext uri="{BB962C8B-B14F-4D97-AF65-F5344CB8AC3E}">
@@ -4913,14 +4704,65 @@
       </p:grpSpPr>
       <p:sp>
         <p:nvSpPr>
+          <p:cNvPr id="60" name="Rectangle 59"/>
+          <p:cNvSpPr/>
+          <p:nvPr/>
+        </p:nvSpPr>
+        <p:spPr>
+          <a:xfrm>
+            <a:off x="1043608" y="332656"/>
+            <a:ext cx="6696744" cy="1027936"/>
+          </a:xfrm>
+          <a:prstGeom prst="rect">
+            <a:avLst/>
+          </a:prstGeom>
+          <a:gradFill>
+            <a:gsLst>
+              <a:gs pos="0">
+                <a:schemeClr val="accent5">
+                  <a:lumMod val="75000"/>
+                </a:schemeClr>
+              </a:gs>
+              <a:gs pos="100000">
+                <a:schemeClr val="accent5">
+                  <a:lumMod val="75000"/>
+                </a:schemeClr>
+              </a:gs>
+            </a:gsLst>
+          </a:gradFill>
+        </p:spPr>
+        <p:style>
+          <a:lnRef idx="1">
+            <a:schemeClr val="dk1"/>
+          </a:lnRef>
+          <a:fillRef idx="2">
+            <a:schemeClr val="dk1"/>
+          </a:fillRef>
+          <a:effectRef idx="1">
+            <a:schemeClr val="dk1"/>
+          </a:effectRef>
+          <a:fontRef idx="minor">
+            <a:schemeClr val="dk1"/>
+          </a:fontRef>
+        </p:style>
+        <p:txBody>
+          <a:bodyPr rtlCol="0" anchor="b" anchorCtr="0"/>
+          <a:lstStyle/>
+          <a:p>
+            <a:endParaRPr lang="en-GB" dirty="0"/>
+          </a:p>
+        </p:txBody>
+      </p:sp>
+      <p:sp>
+        <p:nvSpPr>
           <p:cNvPr id="102" name="Rectangle 101"/>
           <p:cNvSpPr/>
           <p:nvPr/>
         </p:nvSpPr>
         <p:spPr>
           <a:xfrm>
-            <a:off x="503548" y="5425400"/>
-            <a:ext cx="8028892" cy="1315968"/>
+            <a:off x="1043608" y="5425400"/>
+            <a:ext cx="6696744" cy="1315968"/>
           </a:xfrm>
           <a:prstGeom prst="rect">
             <a:avLst/>
@@ -5538,7 +5380,7 @@
         </p:nvSpPr>
         <p:spPr>
           <a:xfrm>
-            <a:off x="3543275" y="773996"/>
+            <a:off x="3543275" y="620688"/>
             <a:ext cx="1225014" cy="576064"/>
           </a:xfrm>
           <a:prstGeom prst="hexagon">
@@ -5587,7 +5429,7 @@
         </p:nvSpPr>
         <p:spPr>
           <a:xfrm>
-            <a:off x="575556" y="5504902"/>
+            <a:off x="1223628" y="5504902"/>
             <a:ext cx="1388326" cy="576064"/>
           </a:xfrm>
           <a:prstGeom prst="hexagon">
@@ -5645,8 +5487,8 @@
               </a:schemeClr>
             </a:solidFill>
             <a:prstDash val="sysDot"/>
-            <a:headEnd type="none"/>
-            <a:tailEnd type="arrow"/>
+            <a:headEnd type="arrow"/>
+            <a:tailEnd type="none"/>
           </a:ln>
         </p:spPr>
         <p:style>
@@ -5672,7 +5514,7 @@
         </p:nvSpPr>
         <p:spPr>
           <a:xfrm>
-            <a:off x="1897617" y="5949280"/>
+            <a:off x="2823634" y="5805264"/>
             <a:ext cx="1388326" cy="576064"/>
           </a:xfrm>
           <a:prstGeom prst="hexagon">
@@ -5714,8 +5556,8 @@
         </p:nvCxnSpPr>
         <p:spPr>
           <a:xfrm rot="16200000" flipV="1">
-            <a:off x="1446329" y="4614805"/>
-            <a:ext cx="2556284" cy="112665"/>
+            <a:off x="1736026" y="4325110"/>
+            <a:ext cx="2399938" cy="535709"/>
           </a:xfrm>
           <a:prstGeom prst="curvedConnector3">
             <a:avLst>
@@ -5757,12 +5599,12 @@
         </p:nvCxnSpPr>
         <p:spPr>
           <a:xfrm rot="16200000" flipV="1">
-            <a:off x="5401596" y="3719015"/>
-            <a:ext cx="2556289" cy="1904252"/>
+            <a:off x="5046840" y="4073773"/>
+            <a:ext cx="2484275" cy="1122724"/>
           </a:xfrm>
           <a:prstGeom prst="curvedConnector3">
             <a:avLst>
-              <a:gd name="adj1" fmla="val 38199"/>
+              <a:gd name="adj1" fmla="val 50000"/>
             </a:avLst>
           </a:prstGeom>
           <a:ln w="19050">
@@ -5792,371 +5634,179 @@
           </a:fontRef>
         </p:style>
       </p:cxnSp>
-      <p:grpSp>
-        <p:nvGrpSpPr>
-          <p:cNvPr id="94" name="Group 93"/>
-          <p:cNvGrpSpPr/>
+      <p:cxnSp>
+        <p:nvCxnSpPr>
+          <p:cNvPr id="38" name="Curved Connector 37"/>
+          <p:cNvCxnSpPr>
+            <a:stCxn id="29" idx="3"/>
+            <a:endCxn id="17" idx="1"/>
+          </p:cNvCxnSpPr>
           <p:nvPr/>
-        </p:nvGrpSpPr>
-        <p:grpSpPr>
-          <a:xfrm>
-            <a:off x="5776436" y="2844738"/>
-            <a:ext cx="3188052" cy="803136"/>
-            <a:chOff x="5776436" y="2811986"/>
-            <a:chExt cx="3188052" cy="803136"/>
-          </a:xfrm>
-        </p:grpSpPr>
-        <p:cxnSp>
-          <p:nvCxnSpPr>
-            <p:cNvPr id="41" name="Curved Connector 40"/>
-            <p:cNvCxnSpPr>
-              <a:stCxn id="29" idx="3"/>
-              <a:endCxn id="14" idx="1"/>
-            </p:cNvCxnSpPr>
-            <p:nvPr/>
-          </p:nvCxnSpPr>
-          <p:spPr>
-            <a:xfrm>
-              <a:off x="5776436" y="3193580"/>
-              <a:ext cx="523756" cy="9577"/>
-            </a:xfrm>
-            <a:prstGeom prst="curvedConnector3">
-              <a:avLst>
-                <a:gd name="adj1" fmla="val 50000"/>
-              </a:avLst>
-            </a:prstGeom>
-            <a:ln w="19050">
-              <a:headEnd type="none"/>
-              <a:tailEnd type="arrow"/>
-            </a:ln>
-          </p:spPr>
-          <p:style>
-            <a:lnRef idx="2">
-              <a:schemeClr val="accent5"/>
-            </a:lnRef>
-            <a:fillRef idx="0">
-              <a:schemeClr val="accent5"/>
-            </a:fillRef>
-            <a:effectRef idx="1">
-              <a:schemeClr val="accent5"/>
-            </a:effectRef>
-            <a:fontRef idx="minor">
-              <a:schemeClr val="tx1"/>
-            </a:fontRef>
-          </p:style>
-        </p:cxnSp>
-        <p:sp>
-          <p:nvSpPr>
-            <p:cNvPr id="14" name="Rectangle 13"/>
-            <p:cNvSpPr/>
-            <p:nvPr/>
-          </p:nvSpPr>
-          <p:spPr>
-            <a:xfrm>
-              <a:off x="6300192" y="2863200"/>
-              <a:ext cx="1311974" cy="679913"/>
-            </a:xfrm>
-            <a:prstGeom prst="rect">
-              <a:avLst/>
-            </a:prstGeom>
-          </p:spPr>
-          <p:style>
-            <a:lnRef idx="1">
-              <a:schemeClr val="accent5"/>
-            </a:lnRef>
-            <a:fillRef idx="2">
-              <a:schemeClr val="accent5"/>
-            </a:fillRef>
-            <a:effectRef idx="1">
-              <a:schemeClr val="accent5"/>
-            </a:effectRef>
-            <a:fontRef idx="minor">
-              <a:schemeClr val="dk1"/>
-            </a:fontRef>
-          </p:style>
-          <p:txBody>
-            <a:bodyPr rtlCol="0" anchor="ctr"/>
-            <a:lstStyle/>
-            <a:p>
-              <a:pPr algn="ctr"/>
-              <a:r>
-                <a:rPr lang="en-GB" dirty="0" err="1" smtClean="0"/>
-                <a:t>DataNucleus</a:t>
-              </a:r>
-              <a:r>
-                <a:rPr lang="en-GB" dirty="0" smtClean="0"/>
-                <a:t>/</a:t>
-              </a:r>
-              <a:br>
-                <a:rPr lang="en-GB" dirty="0" smtClean="0"/>
-              </a:br>
-              <a:r>
-                <a:rPr lang="en-GB" dirty="0" smtClean="0"/>
-                <a:t>RDBMS</a:t>
-              </a:r>
-              <a:endParaRPr lang="en-GB" dirty="0"/>
-            </a:p>
-          </p:txBody>
-        </p:sp>
-        <p:sp>
-          <p:nvSpPr>
-            <p:cNvPr id="16" name="Flowchart: Magnetic Disk 15"/>
-            <p:cNvSpPr/>
-            <p:nvPr/>
-          </p:nvSpPr>
-          <p:spPr>
-            <a:xfrm>
-              <a:off x="8028384" y="2811986"/>
-              <a:ext cx="936104" cy="803136"/>
-            </a:xfrm>
-            <a:prstGeom prst="flowChartMagneticDisk">
-              <a:avLst/>
-            </a:prstGeom>
-          </p:spPr>
-          <p:style>
-            <a:lnRef idx="1">
-              <a:schemeClr val="accent5"/>
-            </a:lnRef>
-            <a:fillRef idx="2">
-              <a:schemeClr val="accent5"/>
-            </a:fillRef>
-            <a:effectRef idx="1">
-              <a:schemeClr val="accent5"/>
-            </a:effectRef>
-            <a:fontRef idx="minor">
-              <a:schemeClr val="dk1"/>
-            </a:fontRef>
-          </p:style>
-          <p:txBody>
-            <a:bodyPr rtlCol="0" anchor="ctr"/>
-            <a:lstStyle/>
-            <a:p>
-              <a:pPr algn="ctr"/>
-              <a:r>
-                <a:rPr lang="en-GB" dirty="0" smtClean="0"/>
-                <a:t>RDBMS</a:t>
-              </a:r>
-              <a:endParaRPr lang="en-GB" dirty="0"/>
-            </a:p>
-          </p:txBody>
-        </p:sp>
-        <p:cxnSp>
-          <p:nvCxnSpPr>
-            <p:cNvPr id="88" name="Curved Connector 87"/>
-            <p:cNvCxnSpPr>
-              <a:stCxn id="14" idx="3"/>
-              <a:endCxn id="16" idx="2"/>
-            </p:cNvCxnSpPr>
-            <p:nvPr/>
-          </p:nvCxnSpPr>
-          <p:spPr>
-            <a:xfrm>
-              <a:off x="7612166" y="3203157"/>
-              <a:ext cx="416218" cy="10397"/>
-            </a:xfrm>
-            <a:prstGeom prst="curvedConnector3">
-              <a:avLst>
-                <a:gd name="adj1" fmla="val 50000"/>
-              </a:avLst>
-            </a:prstGeom>
-            <a:ln w="19050">
-              <a:headEnd type="none"/>
-              <a:tailEnd type="arrow"/>
-            </a:ln>
-          </p:spPr>
-          <p:style>
-            <a:lnRef idx="2">
-              <a:schemeClr val="accent5"/>
-            </a:lnRef>
-            <a:fillRef idx="0">
-              <a:schemeClr val="accent5"/>
-            </a:fillRef>
-            <a:effectRef idx="1">
-              <a:schemeClr val="accent5"/>
-            </a:effectRef>
-            <a:fontRef idx="minor">
-              <a:schemeClr val="tx1"/>
-            </a:fontRef>
-          </p:style>
-        </p:cxnSp>
-      </p:grpSp>
-      <p:grpSp>
-        <p:nvGrpSpPr>
-          <p:cNvPr id="95" name="Group 94"/>
-          <p:cNvGrpSpPr/>
+        </p:nvCxnSpPr>
+        <p:spPr>
+          <a:xfrm>
+            <a:off x="5776436" y="3226332"/>
+            <a:ext cx="523756" cy="667723"/>
+          </a:xfrm>
+          <a:prstGeom prst="curvedConnector3">
+            <a:avLst>
+              <a:gd name="adj1" fmla="val 50000"/>
+            </a:avLst>
+          </a:prstGeom>
+          <a:ln w="19050">
+            <a:headEnd type="none"/>
+            <a:tailEnd type="arrow"/>
+          </a:ln>
+        </p:spPr>
+        <p:style>
+          <a:lnRef idx="2">
+            <a:schemeClr val="accent5"/>
+          </a:lnRef>
+          <a:fillRef idx="0">
+            <a:schemeClr val="accent5"/>
+          </a:fillRef>
+          <a:effectRef idx="1">
+            <a:schemeClr val="accent5"/>
+          </a:effectRef>
+          <a:fontRef idx="minor">
+            <a:schemeClr val="tx1"/>
+          </a:fontRef>
+        </p:style>
+      </p:cxnSp>
+      <p:sp>
+        <p:nvSpPr>
+          <p:cNvPr id="17" name="Rectangle 16"/>
+          <p:cNvSpPr/>
           <p:nvPr/>
-        </p:nvGrpSpPr>
-        <p:grpSpPr>
-          <a:xfrm>
-            <a:off x="5776436" y="3226332"/>
-            <a:ext cx="3188052" cy="1376500"/>
-            <a:chOff x="5776436" y="3132620"/>
-            <a:chExt cx="3188052" cy="1376500"/>
-          </a:xfrm>
-        </p:grpSpPr>
-        <p:cxnSp>
-          <p:nvCxnSpPr>
-            <p:cNvPr id="38" name="Curved Connector 37"/>
-            <p:cNvCxnSpPr>
-              <a:stCxn id="29" idx="3"/>
-              <a:endCxn id="17" idx="1"/>
-            </p:cNvCxnSpPr>
-            <p:nvPr/>
-          </p:nvCxnSpPr>
-          <p:spPr>
-            <a:xfrm>
-              <a:off x="5776436" y="3132620"/>
-              <a:ext cx="523756" cy="963159"/>
-            </a:xfrm>
-            <a:prstGeom prst="curvedConnector3">
-              <a:avLst>
-                <a:gd name="adj1" fmla="val 50000"/>
-              </a:avLst>
-            </a:prstGeom>
-            <a:ln w="19050">
-              <a:headEnd type="none"/>
-              <a:tailEnd type="arrow"/>
-            </a:ln>
-          </p:spPr>
-          <p:style>
-            <a:lnRef idx="2">
-              <a:schemeClr val="accent5"/>
-            </a:lnRef>
-            <a:fillRef idx="0">
-              <a:schemeClr val="accent5"/>
-            </a:fillRef>
-            <a:effectRef idx="1">
-              <a:schemeClr val="accent5"/>
-            </a:effectRef>
-            <a:fontRef idx="minor">
-              <a:schemeClr val="tx1"/>
-            </a:fontRef>
-          </p:style>
-        </p:cxnSp>
-        <p:sp>
-          <p:nvSpPr>
-            <p:cNvPr id="17" name="Rectangle 16"/>
-            <p:cNvSpPr/>
-            <p:nvPr/>
-          </p:nvSpPr>
-          <p:spPr>
-            <a:xfrm>
-              <a:off x="6300192" y="3754446"/>
-              <a:ext cx="1311974" cy="682666"/>
-            </a:xfrm>
-            <a:prstGeom prst="rect">
-              <a:avLst/>
-            </a:prstGeom>
-          </p:spPr>
-          <p:style>
-            <a:lnRef idx="1">
-              <a:schemeClr val="accent5"/>
-            </a:lnRef>
-            <a:fillRef idx="2">
-              <a:schemeClr val="accent5"/>
-            </a:fillRef>
-            <a:effectRef idx="1">
-              <a:schemeClr val="accent5"/>
-            </a:effectRef>
-            <a:fontRef idx="minor">
-              <a:schemeClr val="dk1"/>
-            </a:fontRef>
-          </p:style>
-          <p:txBody>
-            <a:bodyPr rtlCol="0" anchor="ctr"/>
-            <a:lstStyle/>
-            <a:p>
-              <a:pPr algn="ctr"/>
-              <a:r>
-                <a:rPr lang="en-GB" dirty="0" smtClean="0"/>
-                <a:t>JDO/GAE</a:t>
-              </a:r>
-              <a:endParaRPr lang="en-GB" dirty="0"/>
-            </a:p>
-          </p:txBody>
-        </p:sp>
-        <p:sp>
-          <p:nvSpPr>
-            <p:cNvPr id="18" name="Flowchart: Magnetic Disk 17"/>
-            <p:cNvSpPr/>
-            <p:nvPr/>
-          </p:nvSpPr>
-          <p:spPr>
-            <a:xfrm>
-              <a:off x="8028384" y="3702732"/>
-              <a:ext cx="936104" cy="806388"/>
-            </a:xfrm>
-            <a:prstGeom prst="flowChartMagneticDisk">
-              <a:avLst/>
-            </a:prstGeom>
-          </p:spPr>
-          <p:style>
-            <a:lnRef idx="1">
-              <a:schemeClr val="accent5"/>
-            </a:lnRef>
-            <a:fillRef idx="2">
-              <a:schemeClr val="accent5"/>
-            </a:fillRef>
-            <a:effectRef idx="1">
-              <a:schemeClr val="accent5"/>
-            </a:effectRef>
-            <a:fontRef idx="minor">
-              <a:schemeClr val="dk1"/>
-            </a:fontRef>
-          </p:style>
-          <p:txBody>
-            <a:bodyPr rtlCol="0" anchor="ctr"/>
-            <a:lstStyle/>
-            <a:p>
-              <a:pPr algn="ctr"/>
-              <a:r>
-                <a:rPr lang="en-GB" dirty="0" smtClean="0"/>
-                <a:t>GAE</a:t>
-              </a:r>
-              <a:endParaRPr lang="en-GB" dirty="0"/>
-            </a:p>
-          </p:txBody>
-        </p:sp>
-        <p:cxnSp>
-          <p:nvCxnSpPr>
-            <p:cNvPr id="91" name="Curved Connector 90"/>
-            <p:cNvCxnSpPr>
-              <a:stCxn id="17" idx="3"/>
-              <a:endCxn id="18" idx="2"/>
-            </p:cNvCxnSpPr>
-            <p:nvPr/>
-          </p:nvCxnSpPr>
-          <p:spPr>
-            <a:xfrm>
-              <a:off x="7612166" y="4095779"/>
-              <a:ext cx="416218" cy="10147"/>
-            </a:xfrm>
-            <a:prstGeom prst="curvedConnector3">
-              <a:avLst>
-                <a:gd name="adj1" fmla="val 50000"/>
-              </a:avLst>
-            </a:prstGeom>
-            <a:ln w="19050">
-              <a:headEnd type="none"/>
-              <a:tailEnd type="arrow"/>
-            </a:ln>
-          </p:spPr>
-          <p:style>
-            <a:lnRef idx="2">
-              <a:schemeClr val="accent5"/>
-            </a:lnRef>
-            <a:fillRef idx="0">
-              <a:schemeClr val="accent5"/>
-            </a:fillRef>
-            <a:effectRef idx="1">
-              <a:schemeClr val="accent5"/>
-            </a:effectRef>
-            <a:fontRef idx="minor">
-              <a:schemeClr val="tx1"/>
-            </a:fontRef>
-          </p:style>
-        </p:cxnSp>
-      </p:grpSp>
+        </p:nvSpPr>
+        <p:spPr>
+          <a:xfrm>
+            <a:off x="6300192" y="3552722"/>
+            <a:ext cx="1311974" cy="682666"/>
+          </a:xfrm>
+          <a:prstGeom prst="rect">
+            <a:avLst/>
+          </a:prstGeom>
+        </p:spPr>
+        <p:style>
+          <a:lnRef idx="1">
+            <a:schemeClr val="accent5"/>
+          </a:lnRef>
+          <a:fillRef idx="2">
+            <a:schemeClr val="accent5"/>
+          </a:fillRef>
+          <a:effectRef idx="1">
+            <a:schemeClr val="accent5"/>
+          </a:effectRef>
+          <a:fontRef idx="minor">
+            <a:schemeClr val="dk1"/>
+          </a:fontRef>
+        </p:style>
+        <p:txBody>
+          <a:bodyPr rtlCol="0" anchor="ctr"/>
+          <a:lstStyle/>
+          <a:p>
+            <a:pPr algn="ctr"/>
+            <a:r>
+              <a:rPr lang="en-GB" dirty="0" err="1"/>
+              <a:t>DataNucleus</a:t>
+            </a:r>
+            <a:r>
+              <a:rPr lang="en-GB" dirty="0"/>
+              <a:t>/</a:t>
+            </a:r>
+            <a:br>
+              <a:rPr lang="en-GB" dirty="0"/>
+            </a:br>
+            <a:r>
+              <a:rPr lang="en-GB" dirty="0"/>
+              <a:t>RDBMS</a:t>
+            </a:r>
+            <a:endParaRPr lang="en-GB" dirty="0"/>
+          </a:p>
+        </p:txBody>
+      </p:sp>
+      <p:sp>
+        <p:nvSpPr>
+          <p:cNvPr id="18" name="Flowchart: Magnetic Disk 17"/>
+          <p:cNvSpPr/>
+          <p:nvPr/>
+        </p:nvSpPr>
+        <p:spPr>
+          <a:xfrm>
+            <a:off x="8028384" y="3501008"/>
+            <a:ext cx="936104" cy="806388"/>
+          </a:xfrm>
+          <a:prstGeom prst="flowChartMagneticDisk">
+            <a:avLst/>
+          </a:prstGeom>
+        </p:spPr>
+        <p:style>
+          <a:lnRef idx="1">
+            <a:schemeClr val="accent5"/>
+          </a:lnRef>
+          <a:fillRef idx="2">
+            <a:schemeClr val="accent5"/>
+          </a:fillRef>
+          <a:effectRef idx="1">
+            <a:schemeClr val="accent5"/>
+          </a:effectRef>
+          <a:fontRef idx="minor">
+            <a:schemeClr val="dk1"/>
+          </a:fontRef>
+        </p:style>
+        <p:txBody>
+          <a:bodyPr rtlCol="0" anchor="ctr"/>
+          <a:lstStyle/>
+          <a:p>
+            <a:pPr algn="ctr"/>
+            <a:r>
+              <a:rPr lang="en-GB" dirty="0" smtClean="0"/>
+              <a:t>RDBMS</a:t>
+            </a:r>
+            <a:endParaRPr lang="en-GB" dirty="0"/>
+          </a:p>
+        </p:txBody>
+      </p:sp>
+      <p:cxnSp>
+        <p:nvCxnSpPr>
+          <p:cNvPr id="91" name="Curved Connector 90"/>
+          <p:cNvCxnSpPr>
+            <a:stCxn id="17" idx="3"/>
+            <a:endCxn id="18" idx="2"/>
+          </p:cNvCxnSpPr>
+          <p:nvPr/>
+        </p:nvCxnSpPr>
+        <p:spPr>
+          <a:xfrm>
+            <a:off x="7612166" y="3894055"/>
+            <a:ext cx="416218" cy="10147"/>
+          </a:xfrm>
+          <a:prstGeom prst="curvedConnector3">
+            <a:avLst>
+              <a:gd name="adj1" fmla="val 50000"/>
+            </a:avLst>
+          </a:prstGeom>
+          <a:ln w="19050">
+            <a:headEnd type="none"/>
+            <a:tailEnd type="arrow"/>
+          </a:ln>
+        </p:spPr>
+        <p:style>
+          <a:lnRef idx="2">
+            <a:schemeClr val="accent5"/>
+          </a:lnRef>
+          <a:fillRef idx="0">
+            <a:schemeClr val="accent5"/>
+          </a:fillRef>
+          <a:effectRef idx="1">
+            <a:schemeClr val="accent5"/>
+          </a:effectRef>
+          <a:fontRef idx="minor">
+            <a:schemeClr val="tx1"/>
+          </a:fontRef>
+        </p:style>
+      </p:cxnSp>
       <p:sp>
         <p:nvSpPr>
           <p:cNvPr id="66" name="Oval 65"/>
@@ -6165,7 +5815,7 @@
         </p:nvSpPr>
         <p:spPr>
           <a:xfrm>
-            <a:off x="5525196" y="5644530"/>
+            <a:off x="5508104" y="5644530"/>
             <a:ext cx="108012" cy="117304"/>
           </a:xfrm>
           <a:prstGeom prst="ellipse">
@@ -6209,8 +5859,8 @@
         </p:nvSpPr>
         <p:spPr>
           <a:xfrm>
-            <a:off x="585771" y="6222302"/>
-            <a:ext cx="1285929" cy="369332"/>
+            <a:off x="1212421" y="6372036"/>
+            <a:ext cx="2999539" cy="369332"/>
           </a:xfrm>
           <a:prstGeom prst="rect">
             <a:avLst/>
@@ -6225,209 +5875,198 @@
           <a:p>
             <a:r>
               <a:rPr lang="en-GB" dirty="0" smtClean="0"/>
-              <a:t>Isis add-ons</a:t>
+              <a:t>Isis </a:t>
+            </a:r>
+            <a:r>
+              <a:rPr lang="en-GB" dirty="0" smtClean="0"/>
+              <a:t>add-ons SPI implementations</a:t>
             </a:r>
             <a:endParaRPr lang="en-GB" dirty="0"/>
           </a:p>
         </p:txBody>
       </p:sp>
-      <p:grpSp>
-        <p:nvGrpSpPr>
-          <p:cNvPr id="64" name="Group 63"/>
-          <p:cNvGrpSpPr/>
+      <p:cxnSp>
+        <p:nvCxnSpPr>
+          <p:cNvPr id="65" name="Curved Connector 64"/>
+          <p:cNvCxnSpPr>
+            <a:stCxn id="29" idx="3"/>
+            <a:endCxn id="67" idx="1"/>
+          </p:cNvCxnSpPr>
           <p:nvPr/>
-        </p:nvGrpSpPr>
-        <p:grpSpPr>
-          <a:xfrm>
-            <a:off x="5776436" y="1850302"/>
-            <a:ext cx="3207752" cy="1376030"/>
-            <a:chOff x="5756736" y="3702732"/>
-            <a:chExt cx="3207752" cy="1376030"/>
-          </a:xfrm>
-        </p:grpSpPr>
-        <p:cxnSp>
-          <p:nvCxnSpPr>
-            <p:cNvPr id="65" name="Curved Connector 64"/>
-            <p:cNvCxnSpPr>
-              <a:stCxn id="29" idx="3"/>
-              <a:endCxn id="67" idx="1"/>
-            </p:cNvCxnSpPr>
-            <p:nvPr/>
-          </p:nvCxnSpPr>
-          <p:spPr>
-            <a:xfrm flipV="1">
-              <a:off x="5756736" y="4095779"/>
-              <a:ext cx="543456" cy="982983"/>
-            </a:xfrm>
-            <a:prstGeom prst="curvedConnector3">
-              <a:avLst>
-                <a:gd name="adj1" fmla="val 50000"/>
-              </a:avLst>
-            </a:prstGeom>
-            <a:ln w="19050">
-              <a:headEnd type="none"/>
-              <a:tailEnd type="arrow"/>
-            </a:ln>
-          </p:spPr>
-          <p:style>
-            <a:lnRef idx="2">
-              <a:schemeClr val="accent5"/>
-            </a:lnRef>
-            <a:fillRef idx="0">
-              <a:schemeClr val="accent5"/>
-            </a:fillRef>
-            <a:effectRef idx="1">
-              <a:schemeClr val="accent5"/>
-            </a:effectRef>
-            <a:fontRef idx="minor">
-              <a:schemeClr val="tx1"/>
-            </a:fontRef>
-          </p:style>
-        </p:cxnSp>
-        <p:sp>
-          <p:nvSpPr>
-            <p:cNvPr id="67" name="Rectangle 66"/>
-            <p:cNvSpPr/>
-            <p:nvPr/>
-          </p:nvSpPr>
-          <p:spPr>
-            <a:xfrm>
-              <a:off x="6300192" y="3754446"/>
-              <a:ext cx="1311974" cy="682666"/>
-            </a:xfrm>
-            <a:prstGeom prst="rect">
-              <a:avLst/>
-            </a:prstGeom>
-          </p:spPr>
-          <p:style>
-            <a:lnRef idx="1">
-              <a:schemeClr val="accent5"/>
-            </a:lnRef>
-            <a:fillRef idx="2">
-              <a:schemeClr val="accent5"/>
-            </a:fillRef>
-            <a:effectRef idx="1">
-              <a:schemeClr val="accent5"/>
-            </a:effectRef>
-            <a:fontRef idx="minor">
-              <a:schemeClr val="dk1"/>
-            </a:fontRef>
-          </p:style>
-          <p:txBody>
-            <a:bodyPr rtlCol="0" anchor="ctr"/>
-            <a:lstStyle/>
-            <a:p>
-              <a:pPr algn="ctr"/>
-              <a:r>
-                <a:rPr lang="en-GB" dirty="0" err="1" smtClean="0"/>
-                <a:t>DataNucleus</a:t>
-              </a:r>
-              <a:r>
-                <a:rPr lang="en-GB" dirty="0" smtClean="0"/>
-                <a:t>/</a:t>
-              </a:r>
-              <a:br>
-                <a:rPr lang="en-GB" dirty="0" smtClean="0"/>
-              </a:br>
-              <a:r>
-                <a:rPr lang="en-GB" dirty="0" smtClean="0"/>
-                <a:t>Neo4J</a:t>
-              </a:r>
-              <a:endParaRPr lang="en-GB" dirty="0"/>
-            </a:p>
-          </p:txBody>
-        </p:sp>
-        <p:sp>
-          <p:nvSpPr>
-            <p:cNvPr id="69" name="Flowchart: Magnetic Disk 68"/>
-            <p:cNvSpPr/>
-            <p:nvPr/>
-          </p:nvSpPr>
-          <p:spPr>
-            <a:xfrm>
-              <a:off x="8028384" y="3702732"/>
-              <a:ext cx="936104" cy="806388"/>
-            </a:xfrm>
-            <a:prstGeom prst="flowChartMagneticDisk">
-              <a:avLst/>
-            </a:prstGeom>
-          </p:spPr>
-          <p:style>
-            <a:lnRef idx="1">
-              <a:schemeClr val="accent5"/>
-            </a:lnRef>
-            <a:fillRef idx="2">
-              <a:schemeClr val="accent5"/>
-            </a:fillRef>
-            <a:effectRef idx="1">
-              <a:schemeClr val="accent5"/>
-            </a:effectRef>
-            <a:fontRef idx="minor">
-              <a:schemeClr val="dk1"/>
-            </a:fontRef>
-          </p:style>
-          <p:txBody>
-            <a:bodyPr rtlCol="0" anchor="ctr"/>
-            <a:lstStyle/>
-            <a:p>
-              <a:pPr algn="ctr"/>
-              <a:r>
-                <a:rPr lang="en-GB" dirty="0" smtClean="0"/>
-                <a:t>Neo4J</a:t>
-              </a:r>
-              <a:endParaRPr lang="en-GB" dirty="0"/>
-            </a:p>
-          </p:txBody>
-        </p:sp>
-        <p:cxnSp>
-          <p:nvCxnSpPr>
-            <p:cNvPr id="70" name="Curved Connector 69"/>
-            <p:cNvCxnSpPr>
-              <a:stCxn id="67" idx="3"/>
-              <a:endCxn id="69" idx="2"/>
-            </p:cNvCxnSpPr>
-            <p:nvPr/>
-          </p:nvCxnSpPr>
-          <p:spPr>
-            <a:xfrm>
-              <a:off x="7612166" y="4095779"/>
-              <a:ext cx="416218" cy="10147"/>
-            </a:xfrm>
-            <a:prstGeom prst="curvedConnector3">
-              <a:avLst>
-                <a:gd name="adj1" fmla="val 50000"/>
-              </a:avLst>
-            </a:prstGeom>
-            <a:ln w="19050">
-              <a:headEnd type="none"/>
-              <a:tailEnd type="arrow"/>
-            </a:ln>
-          </p:spPr>
-          <p:style>
-            <a:lnRef idx="2">
-              <a:schemeClr val="accent5"/>
-            </a:lnRef>
-            <a:fillRef idx="0">
-              <a:schemeClr val="accent5"/>
-            </a:fillRef>
-            <a:effectRef idx="1">
-              <a:schemeClr val="accent5"/>
-            </a:effectRef>
-            <a:fontRef idx="minor">
-              <a:schemeClr val="tx1"/>
-            </a:fontRef>
-          </p:style>
-        </p:cxnSp>
-      </p:grpSp>
-      <p:sp>
-        <p:nvSpPr>
-          <p:cNvPr id="76" name="Hexagon 75"/>
+        </p:nvCxnSpPr>
+        <p:spPr>
+          <a:xfrm flipV="1">
+            <a:off x="5776436" y="2511603"/>
+            <a:ext cx="543456" cy="714729"/>
+          </a:xfrm>
+          <a:prstGeom prst="curvedConnector3">
+            <a:avLst>
+              <a:gd name="adj1" fmla="val 50000"/>
+            </a:avLst>
+          </a:prstGeom>
+          <a:ln w="19050">
+            <a:headEnd type="none"/>
+            <a:tailEnd type="arrow"/>
+          </a:ln>
+        </p:spPr>
+        <p:style>
+          <a:lnRef idx="2">
+            <a:schemeClr val="accent5"/>
+          </a:lnRef>
+          <a:fillRef idx="0">
+            <a:schemeClr val="accent5"/>
+          </a:fillRef>
+          <a:effectRef idx="1">
+            <a:schemeClr val="accent5"/>
+          </a:effectRef>
+          <a:fontRef idx="minor">
+            <a:schemeClr val="tx1"/>
+          </a:fontRef>
+        </p:style>
+      </p:cxnSp>
+      <p:sp>
+        <p:nvSpPr>
+          <p:cNvPr id="67" name="Rectangle 66"/>
           <p:cNvSpPr/>
           <p:nvPr/>
         </p:nvSpPr>
         <p:spPr>
           <a:xfrm>
-            <a:off x="3167844" y="5517232"/>
+            <a:off x="6319892" y="2170270"/>
+            <a:ext cx="1311974" cy="682666"/>
+          </a:xfrm>
+          <a:prstGeom prst="rect">
+            <a:avLst/>
+          </a:prstGeom>
+        </p:spPr>
+        <p:style>
+          <a:lnRef idx="1">
+            <a:schemeClr val="accent5"/>
+          </a:lnRef>
+          <a:fillRef idx="2">
+            <a:schemeClr val="accent5"/>
+          </a:fillRef>
+          <a:effectRef idx="1">
+            <a:schemeClr val="accent5"/>
+          </a:effectRef>
+          <a:fontRef idx="minor">
+            <a:schemeClr val="dk1"/>
+          </a:fontRef>
+        </p:style>
+        <p:txBody>
+          <a:bodyPr rtlCol="0" anchor="ctr"/>
+          <a:lstStyle/>
+          <a:p>
+            <a:pPr algn="ctr"/>
+            <a:r>
+              <a:rPr lang="en-GB" dirty="0" err="1" smtClean="0"/>
+              <a:t>DataNucleus</a:t>
+            </a:r>
+            <a:r>
+              <a:rPr lang="en-GB" dirty="0" smtClean="0"/>
+              <a:t>/</a:t>
+            </a:r>
+            <a:br>
+              <a:rPr lang="en-GB" dirty="0" smtClean="0"/>
+            </a:br>
+            <a:r>
+              <a:rPr lang="en-GB" dirty="0" smtClean="0"/>
+              <a:t>Neo4J</a:t>
+            </a:r>
+            <a:endParaRPr lang="en-GB" dirty="0"/>
+          </a:p>
+        </p:txBody>
+      </p:sp>
+      <p:sp>
+        <p:nvSpPr>
+          <p:cNvPr id="69" name="Flowchart: Magnetic Disk 68"/>
+          <p:cNvSpPr/>
+          <p:nvPr/>
+        </p:nvSpPr>
+        <p:spPr>
+          <a:xfrm>
+            <a:off x="8048084" y="2118556"/>
+            <a:ext cx="936104" cy="806388"/>
+          </a:xfrm>
+          <a:prstGeom prst="flowChartMagneticDisk">
+            <a:avLst/>
+          </a:prstGeom>
+        </p:spPr>
+        <p:style>
+          <a:lnRef idx="1">
+            <a:schemeClr val="accent5"/>
+          </a:lnRef>
+          <a:fillRef idx="2">
+            <a:schemeClr val="accent5"/>
+          </a:fillRef>
+          <a:effectRef idx="1">
+            <a:schemeClr val="accent5"/>
+          </a:effectRef>
+          <a:fontRef idx="minor">
+            <a:schemeClr val="dk1"/>
+          </a:fontRef>
+        </p:style>
+        <p:txBody>
+          <a:bodyPr rtlCol="0" anchor="ctr"/>
+          <a:lstStyle/>
+          <a:p>
+            <a:pPr algn="ctr"/>
+            <a:r>
+              <a:rPr lang="en-GB" dirty="0" smtClean="0"/>
+              <a:t>Neo4J</a:t>
+            </a:r>
+            <a:endParaRPr lang="en-GB" dirty="0"/>
+          </a:p>
+        </p:txBody>
+      </p:sp>
+      <p:cxnSp>
+        <p:nvCxnSpPr>
+          <p:cNvPr id="70" name="Curved Connector 69"/>
+          <p:cNvCxnSpPr>
+            <a:stCxn id="67" idx="3"/>
+            <a:endCxn id="69" idx="2"/>
+          </p:cNvCxnSpPr>
+          <p:nvPr/>
+        </p:nvCxnSpPr>
+        <p:spPr>
+          <a:xfrm>
+            <a:off x="7631866" y="2511603"/>
+            <a:ext cx="416218" cy="10147"/>
+          </a:xfrm>
+          <a:prstGeom prst="curvedConnector3">
+            <a:avLst>
+              <a:gd name="adj1" fmla="val 50000"/>
+            </a:avLst>
+          </a:prstGeom>
+          <a:ln w="19050">
+            <a:headEnd type="none"/>
+            <a:tailEnd type="arrow"/>
+          </a:ln>
+        </p:spPr>
+        <p:style>
+          <a:lnRef idx="2">
+            <a:schemeClr val="accent5"/>
+          </a:lnRef>
+          <a:fillRef idx="0">
+            <a:schemeClr val="accent5"/>
+          </a:fillRef>
+          <a:effectRef idx="1">
+            <a:schemeClr val="accent5"/>
+          </a:effectRef>
+          <a:fontRef idx="minor">
+            <a:schemeClr val="tx1"/>
+          </a:fontRef>
+        </p:style>
+      </p:cxnSp>
+      <p:sp>
+        <p:nvSpPr>
+          <p:cNvPr id="84" name="Hexagon 83"/>
+          <p:cNvSpPr/>
+          <p:nvPr/>
+        </p:nvSpPr>
+        <p:spPr>
+          <a:xfrm>
+            <a:off x="4788024" y="5517232"/>
             <a:ext cx="1388326" cy="576064"/>
           </a:xfrm>
           <a:prstGeom prst="hexagon">
@@ -6455,7 +6094,7 @@
             <a:pPr algn="ctr"/>
             <a:r>
               <a:rPr lang="en-GB" sz="1600" dirty="0" smtClean="0"/>
-              <a:t>Excel</a:t>
+              <a:t>Publisher</a:t>
             </a:r>
             <a:endParaRPr lang="en-GB" sz="1600" dirty="0"/>
           </a:p>
@@ -6463,13 +6102,13 @@
       </p:sp>
       <p:sp>
         <p:nvSpPr>
-          <p:cNvPr id="81" name="Hexagon 80"/>
+          <p:cNvPr id="89" name="Hexagon 88"/>
           <p:cNvSpPr/>
           <p:nvPr/>
         </p:nvSpPr>
         <p:spPr>
           <a:xfrm>
-            <a:off x="4443814" y="5949280"/>
+            <a:off x="6156176" y="5949280"/>
             <a:ext cx="1388326" cy="576064"/>
           </a:xfrm>
           <a:prstGeom prst="hexagon">
@@ -6496,92 +6135,8 @@
           <a:p>
             <a:pPr algn="ctr"/>
             <a:r>
-              <a:rPr lang="en-GB" sz="1600" dirty="0" smtClean="0"/>
-              <a:t>Settings</a:t>
-            </a:r>
-            <a:endParaRPr lang="en-GB" sz="1600" dirty="0"/>
-          </a:p>
-        </p:txBody>
-      </p:sp>
-      <p:sp>
-        <p:nvSpPr>
-          <p:cNvPr id="84" name="Hexagon 83"/>
-          <p:cNvSpPr/>
-          <p:nvPr/>
-        </p:nvSpPr>
-        <p:spPr>
-          <a:xfrm>
-            <a:off x="5739958" y="5517232"/>
-            <a:ext cx="1388326" cy="576064"/>
-          </a:xfrm>
-          <a:prstGeom prst="hexagon">
-            <a:avLst/>
-          </a:prstGeom>
-        </p:spPr>
-        <p:style>
-          <a:lnRef idx="1">
-            <a:schemeClr val="accent2"/>
-          </a:lnRef>
-          <a:fillRef idx="2">
-            <a:schemeClr val="accent2"/>
-          </a:fillRef>
-          <a:effectRef idx="1">
-            <a:schemeClr val="accent2"/>
-          </a:effectRef>
-          <a:fontRef idx="minor">
-            <a:schemeClr val="dk1"/>
-          </a:fontRef>
-        </p:style>
-        <p:txBody>
-          <a:bodyPr rtlCol="0" anchor="ctr"/>
-          <a:lstStyle/>
-          <a:p>
-            <a:pPr algn="ctr"/>
-            <a:r>
-              <a:rPr lang="en-GB" sz="1600" dirty="0" smtClean="0"/>
-              <a:t>Tags</a:t>
-            </a:r>
-            <a:endParaRPr lang="en-GB" sz="1600" dirty="0"/>
-          </a:p>
-        </p:txBody>
-      </p:sp>
-      <p:sp>
-        <p:nvSpPr>
-          <p:cNvPr id="89" name="Hexagon 88"/>
-          <p:cNvSpPr/>
-          <p:nvPr/>
-        </p:nvSpPr>
-        <p:spPr>
-          <a:xfrm>
-            <a:off x="7036102" y="5949280"/>
-            <a:ext cx="1388326" cy="576064"/>
-          </a:xfrm>
-          <a:prstGeom prst="hexagon">
-            <a:avLst/>
-          </a:prstGeom>
-        </p:spPr>
-        <p:style>
-          <a:lnRef idx="1">
-            <a:schemeClr val="accent2"/>
-          </a:lnRef>
-          <a:fillRef idx="2">
-            <a:schemeClr val="accent2"/>
-          </a:fillRef>
-          <a:effectRef idx="1">
-            <a:schemeClr val="accent2"/>
-          </a:effectRef>
-          <a:fontRef idx="minor">
-            <a:schemeClr val="dk1"/>
-          </a:fontRef>
-        </p:style>
-        <p:txBody>
-          <a:bodyPr rtlCol="0" anchor="ctr"/>
-          <a:lstStyle/>
-          <a:p>
-            <a:pPr algn="ctr"/>
-            <a:r>
-              <a:rPr lang="en-GB" sz="1600" smtClean="0"/>
-              <a:t>Auditing</a:t>
+              <a:rPr lang="en-GB" sz="1600" dirty="0" err="1" smtClean="0"/>
+              <a:t>Auditer</a:t>
             </a:r>
             <a:endParaRPr lang="en-GB" sz="1600" dirty="0"/>
           </a:p>
@@ -6597,8 +6152,8 @@
         </p:nvCxnSpPr>
         <p:spPr>
           <a:xfrm rot="16200000" flipH="1">
-            <a:off x="3650133" y="1949423"/>
-            <a:ext cx="1083306" cy="72008"/>
+            <a:off x="3526622" y="1825912"/>
+            <a:ext cx="1330328" cy="72008"/>
           </a:xfrm>
           <a:prstGeom prst="curvedConnector3">
             <a:avLst>
@@ -6614,7 +6169,7 @@
             </a:solidFill>
             <a:prstDash val="sysDot"/>
             <a:headEnd type="arrow"/>
-            <a:tailEnd type="arrow"/>
+            <a:tailEnd type="none"/>
           </a:ln>
         </p:spPr>
         <p:style>
@@ -6632,152 +6187,49 @@
           </a:fontRef>
         </p:style>
       </p:cxnSp>
-      <p:grpSp>
-        <p:nvGrpSpPr>
-          <p:cNvPr id="113" name="Group 112"/>
-          <p:cNvGrpSpPr/>
+      <p:cxnSp>
+        <p:nvCxnSpPr>
+          <p:cNvPr id="93" name="Curved Connector 92"/>
+          <p:cNvCxnSpPr/>
           <p:nvPr/>
-        </p:nvGrpSpPr>
-        <p:grpSpPr>
-          <a:xfrm>
-            <a:off x="3902166" y="3801964"/>
-            <a:ext cx="1981808" cy="2247924"/>
-            <a:chOff x="3902166" y="3801964"/>
-            <a:chExt cx="1981808" cy="2247924"/>
-          </a:xfrm>
-        </p:grpSpPr>
-        <p:cxnSp>
-          <p:nvCxnSpPr>
-            <p:cNvPr id="44" name="Curved Connector 43"/>
-            <p:cNvCxnSpPr/>
-            <p:nvPr/>
-          </p:nvCxnSpPr>
-          <p:spPr>
-            <a:xfrm rot="5400000" flipH="1" flipV="1">
-              <a:off x="3332692" y="4371438"/>
-              <a:ext cx="1815876" cy="676928"/>
-            </a:xfrm>
-            <a:prstGeom prst="curvedConnector3">
-              <a:avLst>
-                <a:gd name="adj1" fmla="val 50000"/>
-              </a:avLst>
-            </a:prstGeom>
-            <a:ln w="19050">
-              <a:solidFill>
-                <a:schemeClr val="accent2">
-                  <a:lumMod val="60000"/>
-                  <a:lumOff val="40000"/>
-                </a:schemeClr>
-              </a:solidFill>
-              <a:prstDash val="sysDot"/>
-              <a:headEnd type="arrow"/>
-              <a:tailEnd type="arrow"/>
-            </a:ln>
-          </p:spPr>
-          <p:style>
-            <a:lnRef idx="2">
-              <a:schemeClr val="accent2"/>
-            </a:lnRef>
-            <a:fillRef idx="0">
-              <a:schemeClr val="accent2"/>
-            </a:fillRef>
-            <a:effectRef idx="1">
-              <a:schemeClr val="accent2"/>
-            </a:effectRef>
-            <a:fontRef idx="minor">
-              <a:schemeClr val="tx1"/>
-            </a:fontRef>
-          </p:style>
-        </p:cxnSp>
-        <p:cxnSp>
-          <p:nvCxnSpPr>
-            <p:cNvPr id="92" name="Curved Connector 91"/>
-            <p:cNvCxnSpPr/>
-            <p:nvPr/>
-          </p:nvCxnSpPr>
-          <p:spPr>
-            <a:xfrm rot="16200000" flipV="1">
-              <a:off x="3809531" y="4783363"/>
-              <a:ext cx="2188840" cy="344210"/>
-            </a:xfrm>
-            <a:prstGeom prst="curvedConnector3">
-              <a:avLst>
-                <a:gd name="adj1" fmla="val 50000"/>
-              </a:avLst>
-            </a:prstGeom>
-            <a:ln w="19050">
-              <a:solidFill>
-                <a:schemeClr val="accent2">
-                  <a:lumMod val="60000"/>
-                  <a:lumOff val="40000"/>
-                </a:schemeClr>
-              </a:solidFill>
-              <a:prstDash val="sysDot"/>
-              <a:headEnd type="arrow"/>
-              <a:tailEnd type="arrow"/>
-            </a:ln>
-          </p:spPr>
-          <p:style>
-            <a:lnRef idx="2">
-              <a:schemeClr val="accent2"/>
-            </a:lnRef>
-            <a:fillRef idx="0">
-              <a:schemeClr val="accent2"/>
-            </a:fillRef>
-            <a:effectRef idx="1">
-              <a:schemeClr val="accent2"/>
-            </a:effectRef>
-            <a:fontRef idx="minor">
-              <a:schemeClr val="tx1"/>
-            </a:fontRef>
-          </p:style>
-        </p:cxnSp>
-        <p:cxnSp>
-          <p:nvCxnSpPr>
-            <p:cNvPr id="93" name="Curved Connector 92"/>
-            <p:cNvCxnSpPr>
-              <a:stCxn id="84" idx="4"/>
-            </p:cNvCxnSpPr>
-            <p:nvPr/>
-          </p:nvCxnSpPr>
-          <p:spPr>
-            <a:xfrm rot="16200000" flipV="1">
-              <a:off x="4526652" y="4159910"/>
-              <a:ext cx="1715268" cy="999376"/>
-            </a:xfrm>
-            <a:prstGeom prst="curvedConnector3">
-              <a:avLst>
-                <a:gd name="adj1" fmla="val 50000"/>
-              </a:avLst>
-            </a:prstGeom>
-            <a:ln w="19050">
-              <a:solidFill>
-                <a:schemeClr val="accent2">
-                  <a:lumMod val="60000"/>
-                  <a:lumOff val="40000"/>
-                </a:schemeClr>
-              </a:solidFill>
-              <a:prstDash val="sysDot"/>
-              <a:headEnd type="arrow"/>
-              <a:tailEnd type="arrow"/>
-            </a:ln>
-          </p:spPr>
-          <p:style>
-            <a:lnRef idx="2">
-              <a:schemeClr val="accent2"/>
-            </a:lnRef>
-            <a:fillRef idx="0">
-              <a:schemeClr val="accent2"/>
-            </a:fillRef>
-            <a:effectRef idx="1">
-              <a:schemeClr val="accent2"/>
-            </a:effectRef>
-            <a:fontRef idx="minor">
-              <a:schemeClr val="tx1"/>
-            </a:fontRef>
-          </p:style>
-        </p:cxnSp>
-      </p:grpSp>
+        </p:nvCxnSpPr>
+        <p:spPr>
+          <a:xfrm rot="5400000" flipH="1" flipV="1">
+            <a:off x="4570488" y="4360108"/>
+            <a:ext cx="2107086" cy="207163"/>
+          </a:xfrm>
+          <a:prstGeom prst="curvedConnector3">
+            <a:avLst>
+              <a:gd name="adj1" fmla="val 50000"/>
+            </a:avLst>
+          </a:prstGeom>
+          <a:ln w="19050">
+            <a:solidFill>
+              <a:schemeClr val="accent2">
+                <a:lumMod val="60000"/>
+                <a:lumOff val="40000"/>
+              </a:schemeClr>
+            </a:solidFill>
+            <a:prstDash val="sysDot"/>
+            <a:headEnd type="arrow"/>
+            <a:tailEnd type="none"/>
+          </a:ln>
+        </p:spPr>
+        <p:style>
+          <a:lnRef idx="2">
+            <a:schemeClr val="accent2"/>
+          </a:lnRef>
+          <a:fillRef idx="0">
+            <a:schemeClr val="accent2"/>
+          </a:fillRef>
+          <a:effectRef idx="1">
+            <a:schemeClr val="accent2"/>
+          </a:effectRef>
+          <a:fontRef idx="minor">
+            <a:schemeClr val="tx1"/>
+          </a:fontRef>
+        </p:style>
+      </p:cxnSp>
       <p:sp>
         <p:nvSpPr>
           <p:cNvPr id="114" name="Oval 113"/>
@@ -6818,6 +6270,130 @@
           </a:p>
         </p:txBody>
       </p:sp>
+      <p:sp>
+        <p:nvSpPr>
+          <p:cNvPr id="62" name="TextBox 61"/>
+          <p:cNvSpPr txBox="1"/>
+          <p:nvPr/>
+        </p:nvSpPr>
+        <p:spPr>
+          <a:xfrm>
+            <a:off x="1187624" y="404664"/>
+            <a:ext cx="1923925" cy="369332"/>
+          </a:xfrm>
+          <a:prstGeom prst="rect">
+            <a:avLst/>
+          </a:prstGeom>
+          <a:noFill/>
+        </p:spPr>
+        <p:txBody>
+          <a:bodyPr wrap="none" rtlCol="0">
+            <a:spAutoFit/>
+          </a:bodyPr>
+          <a:lstStyle/>
+          <a:p>
+            <a:r>
+              <a:rPr lang="en-GB" dirty="0" smtClean="0"/>
+              <a:t>API implementations</a:t>
+            </a:r>
+            <a:endParaRPr lang="en-GB" dirty="0"/>
+          </a:p>
+        </p:txBody>
+      </p:sp>
+      <p:sp>
+        <p:nvSpPr>
+          <p:cNvPr id="63" name="Hexagon 62"/>
+          <p:cNvSpPr/>
+          <p:nvPr/>
+        </p:nvSpPr>
+        <p:spPr>
+          <a:xfrm>
+            <a:off x="5004048" y="620688"/>
+            <a:ext cx="1225014" cy="576064"/>
+          </a:xfrm>
+          <a:prstGeom prst="hexagon">
+            <a:avLst/>
+          </a:prstGeom>
+        </p:spPr>
+        <p:style>
+          <a:lnRef idx="1">
+            <a:schemeClr val="accent2"/>
+          </a:lnRef>
+          <a:fillRef idx="2">
+            <a:schemeClr val="accent2"/>
+          </a:fillRef>
+          <a:effectRef idx="1">
+            <a:schemeClr val="accent2"/>
+          </a:effectRef>
+          <a:fontRef idx="minor">
+            <a:schemeClr val="dk1"/>
+          </a:fontRef>
+        </p:style>
+        <p:txBody>
+          <a:bodyPr rtlCol="0" anchor="ctr"/>
+          <a:lstStyle/>
+          <a:p>
+            <a:pPr algn="ctr"/>
+            <a:r>
+              <a:rPr lang="en-GB" sz="1600" dirty="0" smtClean="0"/>
+              <a:t>Custom</a:t>
+            </a:r>
+            <a:br>
+              <a:rPr lang="en-GB" sz="1600" dirty="0" smtClean="0"/>
+            </a:br>
+            <a:r>
+              <a:rPr lang="en-GB" sz="1600" dirty="0" smtClean="0"/>
+              <a:t>service</a:t>
+            </a:r>
+            <a:endParaRPr lang="en-GB" sz="1600" dirty="0"/>
+          </a:p>
+        </p:txBody>
+      </p:sp>
+      <p:cxnSp>
+        <p:nvCxnSpPr>
+          <p:cNvPr id="68" name="Curved Connector 67"/>
+          <p:cNvCxnSpPr>
+            <a:endCxn id="19" idx="0"/>
+          </p:cNvCxnSpPr>
+          <p:nvPr/>
+        </p:nvCxnSpPr>
+        <p:spPr>
+          <a:xfrm rot="5400000">
+            <a:off x="4208956" y="1215586"/>
+            <a:ext cx="1330329" cy="1292659"/>
+          </a:xfrm>
+          <a:prstGeom prst="curvedConnector3">
+            <a:avLst>
+              <a:gd name="adj1" fmla="val 39792"/>
+            </a:avLst>
+          </a:prstGeom>
+          <a:ln w="19050">
+            <a:solidFill>
+              <a:schemeClr val="accent2">
+                <a:lumMod val="60000"/>
+                <a:lumOff val="40000"/>
+              </a:schemeClr>
+            </a:solidFill>
+            <a:prstDash val="sysDot"/>
+            <a:headEnd type="arrow"/>
+            <a:tailEnd type="none"/>
+          </a:ln>
+        </p:spPr>
+        <p:style>
+          <a:lnRef idx="2">
+            <a:schemeClr val="accent2"/>
+          </a:lnRef>
+          <a:fillRef idx="0">
+            <a:schemeClr val="accent2"/>
+          </a:fillRef>
+          <a:effectRef idx="1">
+            <a:schemeClr val="accent2"/>
+          </a:effectRef>
+          <a:fontRef idx="minor">
+            <a:schemeClr val="tx1"/>
+          </a:fontRef>
+        </p:style>
+      </p:cxnSp>
     </p:spTree>
     <p:extLst>
       <p:ext uri="{BB962C8B-B14F-4D97-AF65-F5344CB8AC3E}">

</xml_diff>